<commit_message>
made lots of progress on streamlit app
</commit_message>
<xml_diff>
--- a/Documents/Oscar_Presentation.pptx
+++ b/Documents/Oscar_Presentation.pptx
@@ -11,8 +11,8 @@
     <p:sldId id="259" r:id="rId5"/>
     <p:sldId id="260" r:id="rId6"/>
     <p:sldId id="261" r:id="rId7"/>
-    <p:sldId id="262" r:id="rId8"/>
-    <p:sldId id="263" r:id="rId9"/>
+    <p:sldId id="263" r:id="rId8"/>
+    <p:sldId id="262" r:id="rId9"/>
     <p:sldId id="264" r:id="rId10"/>
     <p:sldId id="265" r:id="rId11"/>
   </p:sldIdLst>
@@ -4471,8 +4471,15 @@
             </a:pPr>
             <a:r>
               <a:rPr lang="en-US" altLang="en-US" dirty="0"/>
-              <a:t>Git repo:</a:t>
-            </a:r>
+              <a:t>Git repo: </a:t>
+            </a:r>
+            <a:r>
+              <a:rPr lang="en-US" altLang="en-US" dirty="0">
+                <a:hlinkClick r:id="rId2"/>
+              </a:rPr>
+              <a:t>https://github.com/andy-j-block/lymphoma_classifier</a:t>
+            </a:r>
+            <a:endParaRPr lang="en-US" altLang="en-US" dirty="0"/>
           </a:p>
           <a:p>
             <a:pPr marL="450850" indent="-342900">
@@ -4496,8 +4503,15 @@
             </a:pPr>
             <a:r>
               <a:rPr lang="en-US" altLang="en-US" dirty="0"/>
-              <a:t>Kaggle URL:</a:t>
-            </a:r>
+              <a:t>Kaggle URL: </a:t>
+            </a:r>
+            <a:r>
+              <a:rPr lang="en-US" altLang="en-US" dirty="0">
+                <a:hlinkClick r:id="rId3"/>
+              </a:rPr>
+              <a:t>https://www.kaggle.com/andrewmvd/malignant-lymphoma-classification</a:t>
+            </a:r>
+            <a:endParaRPr lang="en-US" altLang="en-US" dirty="0"/>
           </a:p>
           <a:p>
             <a:pPr marL="450850" indent="-342900">
@@ -4521,30 +4535,32 @@
             </a:pPr>
             <a:r>
               <a:rPr lang="en-US" altLang="en-US" dirty="0"/>
-              <a:t>Authors:</a:t>
-            </a:r>
-          </a:p>
-          <a:p>
-            <a:pPr marL="431800" indent="-323850">
-              <a:buSzPct val="45000"/>
-              <a:buFont typeface="Wingdings" panose="05000000000000000000" pitchFamily="2" charset="2"/>
-              <a:buChar char=""/>
-              <a:tabLst>
-                <a:tab pos="723900" algn="l"/>
-                <a:tab pos="1447800" algn="l"/>
-                <a:tab pos="2171700" algn="l"/>
-                <a:tab pos="2895600" algn="l"/>
-                <a:tab pos="3619500" algn="l"/>
-                <a:tab pos="4343400" algn="l"/>
-                <a:tab pos="5067300" algn="l"/>
-                <a:tab pos="5791200" algn="l"/>
-                <a:tab pos="6515100" algn="l"/>
-                <a:tab pos="7239000" algn="l"/>
-                <a:tab pos="7962900" algn="l"/>
-                <a:tab pos="8686800" algn="l"/>
-              </a:tabLst>
-            </a:pPr>
-            <a:endParaRPr lang="en-US" altLang="en-US" dirty="0"/>
+              <a:t>Authors: Nikita </a:t>
+            </a:r>
+            <a:r>
+              <a:rPr lang="en-US" altLang="en-US" dirty="0" err="1"/>
+              <a:t>Orlov</a:t>
+            </a:r>
+            <a:r>
+              <a:rPr lang="en-US" altLang="en-US" dirty="0"/>
+              <a:t>, Wayne Chen, David </a:t>
+            </a:r>
+            <a:r>
+              <a:rPr lang="en-US" altLang="en-US" dirty="0" err="1"/>
+              <a:t>Eckley</a:t>
+            </a:r>
+            <a:r>
+              <a:rPr lang="en-US" altLang="en-US" dirty="0"/>
+              <a:t>, Tomasz Macura, </a:t>
+            </a:r>
+            <a:r>
+              <a:rPr lang="en-US" altLang="en-US" dirty="0" err="1"/>
+              <a:t>Lior</a:t>
+            </a:r>
+            <a:r>
+              <a:rPr lang="en-US" altLang="en-US" dirty="0"/>
+              <a:t> Shamir, Elaine Jaffe, and Ilya Goldberg</a:t>
+            </a:r>
           </a:p>
         </p:txBody>
       </p:sp>
@@ -4606,31 +4622,337 @@
           </a:p>
         </p:txBody>
       </p:sp>
-      <p:sp>
-        <p:nvSpPr>
-          <p:cNvPr id="3" name="Content Placeholder 2">
+      <p:grpSp>
+        <p:nvGrpSpPr>
+          <p:cNvPr id="10" name="Group 9">
             <a:extLst>
               <a:ext uri="{FF2B5EF4-FFF2-40B4-BE49-F238E27FC236}">
-                <a16:creationId xmlns:a16="http://schemas.microsoft.com/office/drawing/2014/main" id="{29483150-A215-4EBC-9C8A-42911E5745DA}"/>
+                <a16:creationId xmlns:a16="http://schemas.microsoft.com/office/drawing/2014/main" id="{A026794E-984F-4583-88A8-36C25CFF48B5}"/>
               </a:ext>
             </a:extLst>
           </p:cNvPr>
-          <p:cNvSpPr>
-            <a:spLocks noGrp="1"/>
-          </p:cNvSpPr>
-          <p:nvPr>
-            <p:ph idx="1"/>
-          </p:nvPr>
-        </p:nvSpPr>
-        <p:spPr/>
-        <p:txBody>
-          <a:bodyPr/>
-          <a:lstStyle/>
-          <a:p>
-            <a:endParaRPr lang="en-US"/>
-          </a:p>
-        </p:txBody>
-      </p:sp>
+          <p:cNvGrpSpPr/>
+          <p:nvPr/>
+        </p:nvGrpSpPr>
+        <p:grpSpPr>
+          <a:xfrm>
+            <a:off x="283600" y="2270450"/>
+            <a:ext cx="11624800" cy="3215238"/>
+            <a:chOff x="393032" y="2174197"/>
+            <a:chExt cx="11624800" cy="3215238"/>
+          </a:xfrm>
+        </p:grpSpPr>
+        <p:grpSp>
+          <p:nvGrpSpPr>
+            <p:cNvPr id="5" name="Group 4">
+              <a:extLst>
+                <a:ext uri="{FF2B5EF4-FFF2-40B4-BE49-F238E27FC236}">
+                  <a16:creationId xmlns:a16="http://schemas.microsoft.com/office/drawing/2014/main" id="{36B4E52A-D8DA-4281-8466-B93A873D4446}"/>
+                </a:ext>
+              </a:extLst>
+            </p:cNvPr>
+            <p:cNvGrpSpPr/>
+            <p:nvPr/>
+          </p:nvGrpSpPr>
+          <p:grpSpPr>
+            <a:xfrm>
+              <a:off x="393032" y="2174197"/>
+              <a:ext cx="3622258" cy="3215238"/>
+              <a:chOff x="818147" y="2061902"/>
+              <a:chExt cx="3622258" cy="3215238"/>
+            </a:xfrm>
+          </p:grpSpPr>
+          <p:pic>
+            <p:nvPicPr>
+              <p:cNvPr id="1026" name="Picture 2" descr="CLL">
+                <a:extLst>
+                  <a:ext uri="{FF2B5EF4-FFF2-40B4-BE49-F238E27FC236}">
+                    <a16:creationId xmlns:a16="http://schemas.microsoft.com/office/drawing/2014/main" id="{25B8F8FD-7ABB-42EF-9273-92D7C97EAF29}"/>
+                  </a:ext>
+                </a:extLst>
+              </p:cNvPr>
+              <p:cNvPicPr>
+                <a:picLocks noChangeAspect="1" noChangeArrowheads="1"/>
+              </p:cNvPicPr>
+              <p:nvPr/>
+            </p:nvPicPr>
+            <p:blipFill>
+              <a:blip r:embed="rId2">
+                <a:extLst>
+                  <a:ext uri="{28A0092B-C50C-407E-A947-70E740481C1C}">
+                    <a14:useLocalDpi xmlns:a14="http://schemas.microsoft.com/office/drawing/2010/main" val="0"/>
+                  </a:ext>
+                </a:extLst>
+              </a:blip>
+              <a:srcRect/>
+              <a:stretch>
+                <a:fillRect/>
+              </a:stretch>
+            </p:blipFill>
+            <p:spPr bwMode="auto">
+              <a:xfrm>
+                <a:off x="818147" y="2563273"/>
+                <a:ext cx="3622258" cy="2713867"/>
+              </a:xfrm>
+              <a:prstGeom prst="rect">
+                <a:avLst/>
+              </a:prstGeom>
+              <a:noFill/>
+              <a:extLst>
+                <a:ext uri="{909E8E84-426E-40DD-AFC4-6F175D3DCCD1}">
+                  <a14:hiddenFill xmlns:a14="http://schemas.microsoft.com/office/drawing/2010/main">
+                    <a:solidFill>
+                      <a:srgbClr val="FFFFFF"/>
+                    </a:solidFill>
+                  </a14:hiddenFill>
+                </a:ext>
+              </a:extLst>
+            </p:spPr>
+          </p:pic>
+          <p:sp>
+            <p:nvSpPr>
+              <p:cNvPr id="4" name="TextBox 3">
+                <a:extLst>
+                  <a:ext uri="{FF2B5EF4-FFF2-40B4-BE49-F238E27FC236}">
+                    <a16:creationId xmlns:a16="http://schemas.microsoft.com/office/drawing/2014/main" id="{C9266EE9-B54D-454A-9F6B-2D4D94A87B7F}"/>
+                  </a:ext>
+                </a:extLst>
+              </p:cNvPr>
+              <p:cNvSpPr txBox="1"/>
+              <p:nvPr/>
+            </p:nvSpPr>
+            <p:spPr>
+              <a:xfrm>
+                <a:off x="851810" y="2061902"/>
+                <a:ext cx="3554931" cy="369332"/>
+              </a:xfrm>
+              <a:prstGeom prst="rect">
+                <a:avLst/>
+              </a:prstGeom>
+              <a:noFill/>
+            </p:spPr>
+            <p:txBody>
+              <a:bodyPr wrap="square" rtlCol="0">
+                <a:spAutoFit/>
+              </a:bodyPr>
+              <a:lstStyle/>
+              <a:p>
+                <a:r>
+                  <a:rPr lang="en-US"/>
+                  <a:t>Chronic Lymphocytic Leukemia (CLL)</a:t>
+                </a:r>
+                <a:endParaRPr lang="en-US" dirty="0"/>
+              </a:p>
+            </p:txBody>
+          </p:sp>
+        </p:grpSp>
+        <p:grpSp>
+          <p:nvGrpSpPr>
+            <p:cNvPr id="7" name="Group 6">
+              <a:extLst>
+                <a:ext uri="{FF2B5EF4-FFF2-40B4-BE49-F238E27FC236}">
+                  <a16:creationId xmlns:a16="http://schemas.microsoft.com/office/drawing/2014/main" id="{E1D8BB2D-DB7C-4434-B943-2B8260EFAC13}"/>
+                </a:ext>
+              </a:extLst>
+            </p:cNvPr>
+            <p:cNvGrpSpPr/>
+            <p:nvPr/>
+          </p:nvGrpSpPr>
+          <p:grpSpPr>
+            <a:xfrm>
+              <a:off x="4395537" y="2174197"/>
+              <a:ext cx="3621024" cy="3215238"/>
+              <a:chOff x="4772526" y="2110028"/>
+              <a:chExt cx="3621024" cy="3215238"/>
+            </a:xfrm>
+          </p:grpSpPr>
+          <p:pic>
+            <p:nvPicPr>
+              <p:cNvPr id="1028" name="Picture 4" descr="FL">
+                <a:extLst>
+                  <a:ext uri="{FF2B5EF4-FFF2-40B4-BE49-F238E27FC236}">
+                    <a16:creationId xmlns:a16="http://schemas.microsoft.com/office/drawing/2014/main" id="{1ED6627B-9438-4A38-B864-CFC6438F651D}"/>
+                  </a:ext>
+                </a:extLst>
+              </p:cNvPr>
+              <p:cNvPicPr>
+                <a:picLocks noChangeAspect="1" noChangeArrowheads="1"/>
+              </p:cNvPicPr>
+              <p:nvPr/>
+            </p:nvPicPr>
+            <p:blipFill>
+              <a:blip r:embed="rId3">
+                <a:extLst>
+                  <a:ext uri="{28A0092B-C50C-407E-A947-70E740481C1C}">
+                    <a14:useLocalDpi xmlns:a14="http://schemas.microsoft.com/office/drawing/2010/main" val="0"/>
+                  </a:ext>
+                </a:extLst>
+              </a:blip>
+              <a:srcRect/>
+              <a:stretch>
+                <a:fillRect/>
+              </a:stretch>
+            </p:blipFill>
+            <p:spPr bwMode="auto">
+              <a:xfrm>
+                <a:off x="4772526" y="2612324"/>
+                <a:ext cx="3621024" cy="2712942"/>
+              </a:xfrm>
+              <a:prstGeom prst="rect">
+                <a:avLst/>
+              </a:prstGeom>
+              <a:noFill/>
+              <a:extLst>
+                <a:ext uri="{909E8E84-426E-40DD-AFC4-6F175D3DCCD1}">
+                  <a14:hiddenFill xmlns:a14="http://schemas.microsoft.com/office/drawing/2010/main">
+                    <a:solidFill>
+                      <a:srgbClr val="FFFFFF"/>
+                    </a:solidFill>
+                  </a14:hiddenFill>
+                </a:ext>
+              </a:extLst>
+            </p:spPr>
+          </p:pic>
+          <p:sp>
+            <p:nvSpPr>
+              <p:cNvPr id="6" name="TextBox 5">
+                <a:extLst>
+                  <a:ext uri="{FF2B5EF4-FFF2-40B4-BE49-F238E27FC236}">
+                    <a16:creationId xmlns:a16="http://schemas.microsoft.com/office/drawing/2014/main" id="{247AC768-3E52-4CF4-B27C-B048E3F6CF26}"/>
+                  </a:ext>
+                </a:extLst>
+              </p:cNvPr>
+              <p:cNvSpPr txBox="1"/>
+              <p:nvPr/>
+            </p:nvSpPr>
+            <p:spPr>
+              <a:xfrm>
+                <a:off x="5327743" y="2110028"/>
+                <a:ext cx="2510590" cy="369332"/>
+              </a:xfrm>
+              <a:prstGeom prst="rect">
+                <a:avLst/>
+              </a:prstGeom>
+              <a:noFill/>
+            </p:spPr>
+            <p:txBody>
+              <a:bodyPr wrap="square" rtlCol="0">
+                <a:spAutoFit/>
+              </a:bodyPr>
+              <a:lstStyle/>
+              <a:p>
+                <a:r>
+                  <a:rPr lang="en-US" dirty="0"/>
+                  <a:t>Follicular Lymphoma (FL)</a:t>
+                </a:r>
+              </a:p>
+            </p:txBody>
+          </p:sp>
+        </p:grpSp>
+        <p:grpSp>
+          <p:nvGrpSpPr>
+            <p:cNvPr id="9" name="Group 8">
+              <a:extLst>
+                <a:ext uri="{FF2B5EF4-FFF2-40B4-BE49-F238E27FC236}">
+                  <a16:creationId xmlns:a16="http://schemas.microsoft.com/office/drawing/2014/main" id="{66461E56-C055-489F-8CD1-E80598915F30}"/>
+                </a:ext>
+              </a:extLst>
+            </p:cNvPr>
+            <p:cNvGrpSpPr/>
+            <p:nvPr/>
+          </p:nvGrpSpPr>
+          <p:grpSpPr>
+            <a:xfrm>
+              <a:off x="8396808" y="2174197"/>
+              <a:ext cx="3621024" cy="3215238"/>
+              <a:chOff x="8773797" y="2110028"/>
+              <a:chExt cx="3621024" cy="3215238"/>
+            </a:xfrm>
+          </p:grpSpPr>
+          <p:pic>
+            <p:nvPicPr>
+              <p:cNvPr id="1030" name="Picture 6" descr="MCL">
+                <a:extLst>
+                  <a:ext uri="{FF2B5EF4-FFF2-40B4-BE49-F238E27FC236}">
+                    <a16:creationId xmlns:a16="http://schemas.microsoft.com/office/drawing/2014/main" id="{71CF567A-E4ED-42F3-A8A6-11D4D015FAB3}"/>
+                  </a:ext>
+                </a:extLst>
+              </p:cNvPr>
+              <p:cNvPicPr>
+                <a:picLocks noChangeAspect="1" noChangeArrowheads="1"/>
+              </p:cNvPicPr>
+              <p:nvPr/>
+            </p:nvPicPr>
+            <p:blipFill>
+              <a:blip r:embed="rId4">
+                <a:extLst>
+                  <a:ext uri="{28A0092B-C50C-407E-A947-70E740481C1C}">
+                    <a14:useLocalDpi xmlns:a14="http://schemas.microsoft.com/office/drawing/2010/main" val="0"/>
+                  </a:ext>
+                </a:extLst>
+              </a:blip>
+              <a:srcRect/>
+              <a:stretch>
+                <a:fillRect/>
+              </a:stretch>
+            </p:blipFill>
+            <p:spPr bwMode="auto">
+              <a:xfrm>
+                <a:off x="8773797" y="2612324"/>
+                <a:ext cx="3621024" cy="2712942"/>
+              </a:xfrm>
+              <a:prstGeom prst="rect">
+                <a:avLst/>
+              </a:prstGeom>
+              <a:noFill/>
+              <a:extLst>
+                <a:ext uri="{909E8E84-426E-40DD-AFC4-6F175D3DCCD1}">
+                  <a14:hiddenFill xmlns:a14="http://schemas.microsoft.com/office/drawing/2010/main">
+                    <a:solidFill>
+                      <a:srgbClr val="FFFFFF"/>
+                    </a:solidFill>
+                  </a14:hiddenFill>
+                </a:ext>
+              </a:extLst>
+            </p:spPr>
+          </p:pic>
+          <p:sp>
+            <p:nvSpPr>
+              <p:cNvPr id="8" name="TextBox 7">
+                <a:extLst>
+                  <a:ext uri="{FF2B5EF4-FFF2-40B4-BE49-F238E27FC236}">
+                    <a16:creationId xmlns:a16="http://schemas.microsoft.com/office/drawing/2014/main" id="{02AC94DD-00B7-4300-86C5-1D209FC347FE}"/>
+                  </a:ext>
+                </a:extLst>
+              </p:cNvPr>
+              <p:cNvSpPr txBox="1"/>
+              <p:nvPr/>
+            </p:nvSpPr>
+            <p:spPr>
+              <a:xfrm>
+                <a:off x="9088383" y="2110028"/>
+                <a:ext cx="2991852" cy="369332"/>
+              </a:xfrm>
+              <a:prstGeom prst="rect">
+                <a:avLst/>
+              </a:prstGeom>
+              <a:noFill/>
+            </p:spPr>
+            <p:txBody>
+              <a:bodyPr wrap="square" rtlCol="0">
+                <a:spAutoFit/>
+              </a:bodyPr>
+              <a:lstStyle/>
+              <a:p>
+                <a:r>
+                  <a:rPr lang="en-US" dirty="0"/>
+                  <a:t>Mantle Cell Lymphoma (MCL)</a:t>
+                </a:r>
+              </a:p>
+            </p:txBody>
+          </p:sp>
+        </p:grpSp>
+      </p:grpSp>
     </p:spTree>
     <p:extLst>
       <p:ext uri="{BB962C8B-B14F-4D97-AF65-F5344CB8AC3E}">
@@ -4749,7 +5071,7 @@
           <p:cNvPr id="2" name="Title 1">
             <a:extLst>
               <a:ext uri="{FF2B5EF4-FFF2-40B4-BE49-F238E27FC236}">
-                <a16:creationId xmlns:a16="http://schemas.microsoft.com/office/drawing/2014/main" id="{F29310EC-BAD7-4DFD-9403-18758BBC6E99}"/>
+                <a16:creationId xmlns:a16="http://schemas.microsoft.com/office/drawing/2014/main" id="{D3472FAE-F89C-42EA-9A3D-156B4F9A6A88}"/>
               </a:ext>
             </a:extLst>
           </p:cNvPr>
@@ -4767,7 +5089,7 @@
           <a:p>
             <a:r>
               <a:rPr lang="en-US" dirty="0"/>
-              <a:t>Nested K-Fold</a:t>
+              <a:t>Image Data Augmentation</a:t>
             </a:r>
           </a:p>
         </p:txBody>
@@ -4777,7 +5099,7 @@
           <p:cNvPr id="3" name="Content Placeholder 2">
             <a:extLst>
               <a:ext uri="{FF2B5EF4-FFF2-40B4-BE49-F238E27FC236}">
-                <a16:creationId xmlns:a16="http://schemas.microsoft.com/office/drawing/2014/main" id="{54DC0323-2AA9-4499-8184-B62733C62D06}"/>
+                <a16:creationId xmlns:a16="http://schemas.microsoft.com/office/drawing/2014/main" id="{5AE18444-3AB2-436D-BC6B-35BB15F3DD9E}"/>
               </a:ext>
             </a:extLst>
           </p:cNvPr>
@@ -4793,14 +5115,132 @@
           <a:bodyPr/>
           <a:lstStyle/>
           <a:p>
-            <a:endParaRPr lang="en-US"/>
+            <a:pPr marL="450850" indent="-342900">
+              <a:buSzPct val="65000"/>
+              <a:buFont typeface="Wingdings" panose="05000000000000000000" pitchFamily="2" charset="2"/>
+              <a:buChar char="§"/>
+              <a:tabLst>
+                <a:tab pos="723900" algn="l"/>
+                <a:tab pos="1447800" algn="l"/>
+                <a:tab pos="2171700" algn="l"/>
+                <a:tab pos="2895600" algn="l"/>
+                <a:tab pos="3619500" algn="l"/>
+                <a:tab pos="4343400" algn="l"/>
+                <a:tab pos="5067300" algn="l"/>
+                <a:tab pos="5791200" algn="l"/>
+                <a:tab pos="6515100" algn="l"/>
+                <a:tab pos="7239000" algn="l"/>
+                <a:tab pos="7962900" algn="l"/>
+                <a:tab pos="8686800" algn="l"/>
+              </a:tabLst>
+            </a:pPr>
+            <a:r>
+              <a:rPr lang="en-US" altLang="en-US" dirty="0"/>
+              <a:t>Since the overall dataset is pretty small (n=374), augmenting the dataset with was a high priority task</a:t>
+            </a:r>
+          </a:p>
+          <a:p>
+            <a:pPr marL="450850" indent="-342900">
+              <a:buSzPct val="65000"/>
+              <a:buFont typeface="Wingdings" panose="05000000000000000000" pitchFamily="2" charset="2"/>
+              <a:buChar char="§"/>
+              <a:tabLst>
+                <a:tab pos="723900" algn="l"/>
+                <a:tab pos="1447800" algn="l"/>
+                <a:tab pos="2171700" algn="l"/>
+                <a:tab pos="2895600" algn="l"/>
+                <a:tab pos="3619500" algn="l"/>
+                <a:tab pos="4343400" algn="l"/>
+                <a:tab pos="5067300" algn="l"/>
+                <a:tab pos="5791200" algn="l"/>
+                <a:tab pos="6515100" algn="l"/>
+                <a:tab pos="7239000" algn="l"/>
+                <a:tab pos="7962900" algn="l"/>
+                <a:tab pos="8686800" algn="l"/>
+              </a:tabLst>
+            </a:pPr>
+            <a:r>
+              <a:rPr lang="en-US" altLang="en-US" dirty="0" err="1"/>
+              <a:t>Pytorch</a:t>
+            </a:r>
+            <a:r>
+              <a:rPr lang="en-US" altLang="en-US"/>
+              <a:t> and OpenCV </a:t>
+            </a:r>
+            <a:r>
+              <a:rPr lang="en-US" altLang="en-US" dirty="0"/>
+              <a:t>has a substantial library of image augmentations, but after researching other available tools, </a:t>
+            </a:r>
+            <a:r>
+              <a:rPr lang="en-US" altLang="en-US" dirty="0" err="1"/>
+              <a:t>Albumentations</a:t>
+            </a:r>
+            <a:r>
+              <a:rPr lang="en-US" altLang="en-US" dirty="0"/>
+              <a:t> stuck out as the most comprehensive and </a:t>
+            </a:r>
+          </a:p>
+          <a:p>
+            <a:pPr marL="450850" indent="-342900">
+              <a:buSzPct val="65000"/>
+              <a:buFont typeface="Wingdings" panose="05000000000000000000" pitchFamily="2" charset="2"/>
+              <a:buChar char="§"/>
+              <a:tabLst>
+                <a:tab pos="723900" algn="l"/>
+                <a:tab pos="1447800" algn="l"/>
+                <a:tab pos="2171700" algn="l"/>
+                <a:tab pos="2895600" algn="l"/>
+                <a:tab pos="3619500" algn="l"/>
+                <a:tab pos="4343400" algn="l"/>
+                <a:tab pos="5067300" algn="l"/>
+                <a:tab pos="5791200" algn="l"/>
+                <a:tab pos="6515100" algn="l"/>
+                <a:tab pos="7239000" algn="l"/>
+                <a:tab pos="7962900" algn="l"/>
+                <a:tab pos="8686800" algn="l"/>
+              </a:tabLst>
+            </a:pPr>
+            <a:r>
+              <a:rPr lang="en-US" altLang="en-US" dirty="0"/>
+              <a:t>Created an array of potential image transformations, each with a probability variable </a:t>
+            </a:r>
+            <a:r>
+              <a:rPr lang="en-US" altLang="en-US" dirty="0">
+                <a:latin typeface="Courier New" panose="02070309020205020404" pitchFamily="49" charset="0"/>
+                <a:cs typeface="Courier New" panose="02070309020205020404" pitchFamily="49" charset="0"/>
+              </a:rPr>
+              <a:t>p</a:t>
+            </a:r>
+            <a:endParaRPr lang="en-US" altLang="en-US" dirty="0"/>
+          </a:p>
+          <a:p>
+            <a:pPr marL="450850" indent="-342900">
+              <a:buSzPct val="65000"/>
+              <a:buFont typeface="Wingdings" panose="05000000000000000000" pitchFamily="2" charset="2"/>
+              <a:buChar char="§"/>
+              <a:tabLst>
+                <a:tab pos="723900" algn="l"/>
+                <a:tab pos="1447800" algn="l"/>
+                <a:tab pos="2171700" algn="l"/>
+                <a:tab pos="2895600" algn="l"/>
+                <a:tab pos="3619500" algn="l"/>
+                <a:tab pos="4343400" algn="l"/>
+                <a:tab pos="5067300" algn="l"/>
+                <a:tab pos="5791200" algn="l"/>
+                <a:tab pos="6515100" algn="l"/>
+                <a:tab pos="7239000" algn="l"/>
+                <a:tab pos="7962900" algn="l"/>
+                <a:tab pos="8686800" algn="l"/>
+              </a:tabLst>
+            </a:pPr>
+            <a:endParaRPr lang="en-US" altLang="en-US" dirty="0"/>
           </a:p>
         </p:txBody>
       </p:sp>
     </p:spTree>
     <p:extLst>
       <p:ext uri="{BB962C8B-B14F-4D97-AF65-F5344CB8AC3E}">
-        <p14:creationId xmlns:p14="http://schemas.microsoft.com/office/powerpoint/2010/main" val="2553115799"/>
+        <p14:creationId xmlns:p14="http://schemas.microsoft.com/office/powerpoint/2010/main" val="977503061"/>
       </p:ext>
     </p:extLst>
   </p:cSld>
@@ -4832,7 +5272,7 @@
           <p:cNvPr id="2" name="Title 1">
             <a:extLst>
               <a:ext uri="{FF2B5EF4-FFF2-40B4-BE49-F238E27FC236}">
-                <a16:creationId xmlns:a16="http://schemas.microsoft.com/office/drawing/2014/main" id="{D3472FAE-F89C-42EA-9A3D-156B4F9A6A88}"/>
+                <a16:creationId xmlns:a16="http://schemas.microsoft.com/office/drawing/2014/main" id="{F29310EC-BAD7-4DFD-9403-18758BBC6E99}"/>
               </a:ext>
             </a:extLst>
           </p:cNvPr>
@@ -4850,7 +5290,7 @@
           <a:p>
             <a:r>
               <a:rPr lang="en-US" dirty="0"/>
-              <a:t>Image Data Augmentation</a:t>
+              <a:t>Nested K-Fold</a:t>
             </a:r>
           </a:p>
         </p:txBody>
@@ -4860,7 +5300,7 @@
           <p:cNvPr id="3" name="Content Placeholder 2">
             <a:extLst>
               <a:ext uri="{FF2B5EF4-FFF2-40B4-BE49-F238E27FC236}">
-                <a16:creationId xmlns:a16="http://schemas.microsoft.com/office/drawing/2014/main" id="{5AE18444-3AB2-436D-BC6B-35BB15F3DD9E}"/>
+                <a16:creationId xmlns:a16="http://schemas.microsoft.com/office/drawing/2014/main" id="{54DC0323-2AA9-4499-8184-B62733C62D06}"/>
               </a:ext>
             </a:extLst>
           </p:cNvPr>
@@ -4896,34 +5336,8 @@
               </a:tabLst>
             </a:pPr>
             <a:r>
-              <a:rPr lang="en-US" altLang="en-US" dirty="0" err="1"/>
-              <a:t>Albumentations</a:t>
-            </a:r>
-            <a:endParaRPr lang="en-US" altLang="en-US" dirty="0"/>
-          </a:p>
-          <a:p>
-            <a:pPr marL="450850" indent="-342900">
-              <a:buSzPct val="65000"/>
-              <a:buFont typeface="Wingdings" panose="05000000000000000000" pitchFamily="2" charset="2"/>
-              <a:buChar char="§"/>
-              <a:tabLst>
-                <a:tab pos="723900" algn="l"/>
-                <a:tab pos="1447800" algn="l"/>
-                <a:tab pos="2171700" algn="l"/>
-                <a:tab pos="2895600" algn="l"/>
-                <a:tab pos="3619500" algn="l"/>
-                <a:tab pos="4343400" algn="l"/>
-                <a:tab pos="5067300" algn="l"/>
-                <a:tab pos="5791200" algn="l"/>
-                <a:tab pos="6515100" algn="l"/>
-                <a:tab pos="7239000" algn="l"/>
-                <a:tab pos="7962900" algn="l"/>
-                <a:tab pos="8686800" algn="l"/>
-              </a:tabLst>
-            </a:pPr>
-            <a:r>
               <a:rPr lang="en-US" altLang="en-US" dirty="0"/>
-              <a:t>Created an array of potential image transformations, each with a probability variable</a:t>
+              <a:t>In order to expand the training set and </a:t>
             </a:r>
           </a:p>
         </p:txBody>
@@ -4931,7 +5345,7 @@
     </p:spTree>
     <p:extLst>
       <p:ext uri="{BB962C8B-B14F-4D97-AF65-F5344CB8AC3E}">
-        <p14:creationId xmlns:p14="http://schemas.microsoft.com/office/powerpoint/2010/main" val="977503061"/>
+        <p14:creationId xmlns:p14="http://schemas.microsoft.com/office/powerpoint/2010/main" val="2553115799"/>
       </p:ext>
     </p:extLst>
   </p:cSld>

</xml_diff>